<commit_message>
courses page is shaping up
</commit_message>
<xml_diff>
--- a/assets/general/img/Courses_logos.pptx
+++ b/assets/general/img/Courses_logos.pptx
@@ -10,6 +10,7 @@
     <p:sldId id="258" r:id="rId4"/>
     <p:sldId id="259" r:id="rId5"/>
     <p:sldId id="260" r:id="rId6"/>
+    <p:sldId id="261" r:id="rId7"/>
   </p:sldIdLst>
   <p:sldSz cx="12192000" cy="6858000"/>
   <p:notesSz cx="6858000" cy="9144000"/>
@@ -4013,6 +4014,106 @@
 </p:sld>
 </file>
 
+<file path=ppt/slides/slide6.xml><?xml version="1.0" encoding="utf-8"?>
+<p:sld xmlns:a="http://schemas.openxmlformats.org/drawingml/2006/main" xmlns:r="http://schemas.openxmlformats.org/officeDocument/2006/relationships" xmlns:p="http://schemas.openxmlformats.org/presentationml/2006/main">
+  <p:cSld>
+    <p:bg>
+      <p:bgPr>
+        <a:solidFill>
+          <a:schemeClr val="bg1"/>
+        </a:solidFill>
+        <a:effectLst/>
+      </p:bgPr>
+    </p:bg>
+    <p:spTree>
+      <p:nvGrpSpPr>
+        <p:cNvPr id="1" name=""/>
+        <p:cNvGrpSpPr/>
+        <p:nvPr/>
+      </p:nvGrpSpPr>
+      <p:grpSpPr>
+        <a:xfrm>
+          <a:off x="0" y="0"/>
+          <a:ext cx="0" cy="0"/>
+          <a:chOff x="0" y="0"/>
+          <a:chExt cx="0" cy="0"/>
+        </a:xfrm>
+      </p:grpSpPr>
+      <p:sp>
+        <p:nvSpPr>
+          <p:cNvPr id="79" name="TextBox 78">
+            <a:extLst>
+              <a:ext uri="{FF2B5EF4-FFF2-40B4-BE49-F238E27FC236}">
+                <a16:creationId xmlns:a16="http://schemas.microsoft.com/office/drawing/2014/main" id="{194B7995-B9C1-CAF2-E3A1-C2DBFEDEEF46}"/>
+              </a:ext>
+            </a:extLst>
+          </p:cNvPr>
+          <p:cNvSpPr txBox="1"/>
+          <p:nvPr/>
+        </p:nvSpPr>
+        <p:spPr>
+          <a:xfrm>
+            <a:off x="2002276" y="1163663"/>
+            <a:ext cx="8807219" cy="2862322"/>
+          </a:xfrm>
+          <a:prstGeom prst="rect">
+            <a:avLst/>
+          </a:prstGeom>
+          <a:noFill/>
+        </p:spPr>
+        <p:txBody>
+          <a:bodyPr wrap="none" rtlCol="0">
+            <a:spAutoFit/>
+          </a:bodyPr>
+          <a:lstStyle/>
+          <a:p>
+            <a:pPr algn="ctr"/>
+            <a:r>
+              <a:rPr lang="en-US" sz="18000" dirty="0" err="1">
+                <a:solidFill>
+                  <a:srgbClr val="931915"/>
+                </a:solidFill>
+                <a:latin typeface="Impact" panose="020B0806030902050204" pitchFamily="34" charset="0"/>
+              </a:rPr>
+              <a:t>H</a:t>
+            </a:r>
+            <a:r>
+              <a:rPr lang="en-US" sz="18000" dirty="0" err="1">
+                <a:latin typeface="Impact" panose="020B0806030902050204" pitchFamily="34" charset="0"/>
+              </a:rPr>
+              <a:t>arvard</a:t>
+            </a:r>
+            <a:r>
+              <a:rPr lang="en-US" sz="18000" dirty="0" err="1">
+                <a:solidFill>
+                  <a:srgbClr val="931915"/>
+                </a:solidFill>
+                <a:latin typeface="Impact" panose="020B0806030902050204" pitchFamily="34" charset="0"/>
+              </a:rPr>
+              <a:t>X</a:t>
+            </a:r>
+            <a:endParaRPr lang="en-US" sz="18000" dirty="0">
+              <a:solidFill>
+                <a:srgbClr val="931915"/>
+              </a:solidFill>
+              <a:latin typeface="Impact" panose="020B0806030902050204" pitchFamily="34" charset="0"/>
+            </a:endParaRPr>
+          </a:p>
+        </p:txBody>
+      </p:sp>
+    </p:spTree>
+    <p:extLst>
+      <p:ext uri="{BB962C8B-B14F-4D97-AF65-F5344CB8AC3E}">
+        <p14:creationId xmlns:p14="http://schemas.microsoft.com/office/powerpoint/2010/main" val="1529363008"/>
+      </p:ext>
+    </p:extLst>
+  </p:cSld>
+  <p:clrMapOvr>
+    <a:masterClrMapping/>
+  </p:clrMapOvr>
+</p:sld>
+</file>
+
 <file path=ppt/theme/theme1.xml><?xml version="1.0" encoding="utf-8"?>
 <a:theme xmlns:a="http://schemas.openxmlformats.org/drawingml/2006/main" name="Office Theme 2013 - 2022">
   <a:themeElements>

</xml_diff>